<commit_message>
Editing powerpoint for week 4
</commit_message>
<xml_diff>
--- a/week_4/5 - Modern Computing in Simple Packages.pptx
+++ b/week_4/5 - Modern Computing in Simple Packages.pptx
@@ -8,7 +8,9 @@
     <p:sldId id="256" r:id="rId2"/>
     <p:sldId id="257" r:id="rId3"/>
     <p:sldId id="258" r:id="rId4"/>
-    <p:sldId id="259" r:id="rId5"/>
+    <p:sldId id="260" r:id="rId5"/>
+    <p:sldId id="259" r:id="rId6"/>
+    <p:sldId id="261" r:id="rId7"/>
   </p:sldIdLst>
   <p:sldSz cx="9144000" cy="6858000" type="screen4x3"/>
   <p:notesSz cx="6858000" cy="9144000"/>
@@ -291,7 +293,7 @@
           <a:p>
             <a:fld id="{4DAF00EE-A4A9-BA4F-99D5-B01F44C40F36}" type="datetimeFigureOut">
               <a:rPr lang="en-US" smtClean="0"/>
-              <a:t>6/24/15</a:t>
+              <a:t>8/9/15</a:t>
             </a:fld>
             <a:endParaRPr lang="en-US"/>
           </a:p>
@@ -461,7 +463,7 @@
           <a:p>
             <a:fld id="{4DAF00EE-A4A9-BA4F-99D5-B01F44C40F36}" type="datetimeFigureOut">
               <a:rPr lang="en-US" smtClean="0"/>
-              <a:t>6/24/15</a:t>
+              <a:t>8/9/15</a:t>
             </a:fld>
             <a:endParaRPr lang="en-US"/>
           </a:p>
@@ -641,7 +643,7 @@
           <a:p>
             <a:fld id="{4DAF00EE-A4A9-BA4F-99D5-B01F44C40F36}" type="datetimeFigureOut">
               <a:rPr lang="en-US" smtClean="0"/>
-              <a:t>6/24/15</a:t>
+              <a:t>8/9/15</a:t>
             </a:fld>
             <a:endParaRPr lang="en-US"/>
           </a:p>
@@ -811,7 +813,7 @@
           <a:p>
             <a:fld id="{4DAF00EE-A4A9-BA4F-99D5-B01F44C40F36}" type="datetimeFigureOut">
               <a:rPr lang="en-US" smtClean="0"/>
-              <a:t>6/24/15</a:t>
+              <a:t>8/9/15</a:t>
             </a:fld>
             <a:endParaRPr lang="en-US"/>
           </a:p>
@@ -1057,7 +1059,7 @@
           <a:p>
             <a:fld id="{4DAF00EE-A4A9-BA4F-99D5-B01F44C40F36}" type="datetimeFigureOut">
               <a:rPr lang="en-US" smtClean="0"/>
-              <a:t>6/24/15</a:t>
+              <a:t>8/9/15</a:t>
             </a:fld>
             <a:endParaRPr lang="en-US"/>
           </a:p>
@@ -1345,7 +1347,7 @@
           <a:p>
             <a:fld id="{4DAF00EE-A4A9-BA4F-99D5-B01F44C40F36}" type="datetimeFigureOut">
               <a:rPr lang="en-US" smtClean="0"/>
-              <a:t>6/24/15</a:t>
+              <a:t>8/9/15</a:t>
             </a:fld>
             <a:endParaRPr lang="en-US"/>
           </a:p>
@@ -1767,7 +1769,7 @@
           <a:p>
             <a:fld id="{4DAF00EE-A4A9-BA4F-99D5-B01F44C40F36}" type="datetimeFigureOut">
               <a:rPr lang="en-US" smtClean="0"/>
-              <a:t>6/24/15</a:t>
+              <a:t>8/9/15</a:t>
             </a:fld>
             <a:endParaRPr lang="en-US"/>
           </a:p>
@@ -1885,7 +1887,7 @@
           <a:p>
             <a:fld id="{4DAF00EE-A4A9-BA4F-99D5-B01F44C40F36}" type="datetimeFigureOut">
               <a:rPr lang="en-US" smtClean="0"/>
-              <a:t>6/24/15</a:t>
+              <a:t>8/9/15</a:t>
             </a:fld>
             <a:endParaRPr lang="en-US"/>
           </a:p>
@@ -1980,7 +1982,7 @@
           <a:p>
             <a:fld id="{4DAF00EE-A4A9-BA4F-99D5-B01F44C40F36}" type="datetimeFigureOut">
               <a:rPr lang="en-US" smtClean="0"/>
-              <a:t>6/24/15</a:t>
+              <a:t>8/9/15</a:t>
             </a:fld>
             <a:endParaRPr lang="en-US"/>
           </a:p>
@@ -2257,7 +2259,7 @@
           <a:p>
             <a:fld id="{4DAF00EE-A4A9-BA4F-99D5-B01F44C40F36}" type="datetimeFigureOut">
               <a:rPr lang="en-US" smtClean="0"/>
-              <a:t>6/24/15</a:t>
+              <a:t>8/9/15</a:t>
             </a:fld>
             <a:endParaRPr lang="en-US"/>
           </a:p>
@@ -2510,7 +2512,7 @@
           <a:p>
             <a:fld id="{4DAF00EE-A4A9-BA4F-99D5-B01F44C40F36}" type="datetimeFigureOut">
               <a:rPr lang="en-US" smtClean="0"/>
-              <a:t>6/24/15</a:t>
+              <a:t>8/9/15</a:t>
             </a:fld>
             <a:endParaRPr lang="en-US"/>
           </a:p>
@@ -2723,7 +2725,7 @@
           <a:p>
             <a:fld id="{4DAF00EE-A4A9-BA4F-99D5-B01F44C40F36}" type="datetimeFigureOut">
               <a:rPr lang="en-US" smtClean="0"/>
-              <a:t>6/24/15</a:t>
+              <a:t>8/9/15</a:t>
             </a:fld>
             <a:endParaRPr lang="en-US"/>
           </a:p>
@@ -3121,25 +3123,6 @@
           </a:p>
         </p:txBody>
       </p:sp>
-      <p:sp>
-        <p:nvSpPr>
-          <p:cNvPr id="3" name="Subtitle 2"/>
-          <p:cNvSpPr>
-            <a:spLocks noGrp="1"/>
-          </p:cNvSpPr>
-          <p:nvPr>
-            <p:ph type="subTitle" idx="1"/>
-          </p:nvPr>
-        </p:nvSpPr>
-        <p:spPr/>
-        <p:txBody>
-          <a:bodyPr/>
-          <a:lstStyle/>
-          <a:p>
-            <a:endParaRPr lang="en-US" dirty="0"/>
-          </a:p>
-        </p:txBody>
-      </p:sp>
     </p:spTree>
     <p:extLst>
       <p:ext uri="{BB962C8B-B14F-4D97-AF65-F5344CB8AC3E}">
@@ -3211,7 +3194,7 @@
         </p:spPr>
         <p:txBody>
           <a:bodyPr>
-            <a:normAutofit lnSpcReduction="10000"/>
+            <a:normAutofit fontScale="92500" lnSpcReduction="20000"/>
           </a:bodyPr>
           <a:lstStyle/>
           <a:p>
@@ -3226,12 +3209,12 @@
               <a:t>You can save the python </a:t>
             </a:r>
             <a:r>
-              <a:rPr lang="en-US" dirty="0" err="1" smtClean="0"/>
-              <a:t>snipets</a:t>
-            </a:r>
-            <a:r>
               <a:rPr lang="en-US" dirty="0" smtClean="0"/>
-              <a:t> into a regular text file, add the “.</a:t>
+              <a:t>snippets </a:t>
+            </a:r>
+            <a:r>
+              <a:rPr lang="en-US" dirty="0" smtClean="0"/>
+              <a:t>into a regular text file, add the “.</a:t>
             </a:r>
             <a:r>
               <a:rPr lang="en-US" dirty="0" err="1" smtClean="0"/>
@@ -3242,13 +3225,18 @@
               <a:t>” </a:t>
             </a:r>
             <a:r>
-              <a:rPr lang="en-US" dirty="0" err="1" smtClean="0"/>
-              <a:t>extention</a:t>
-            </a:r>
-            <a:r>
               <a:rPr lang="en-US" dirty="0" smtClean="0"/>
-              <a:t> and run it</a:t>
-            </a:r>
+              <a:t>extension </a:t>
+            </a:r>
+            <a:r>
+              <a:rPr lang="en-US" dirty="0" smtClean="0"/>
+              <a:t>and run </a:t>
+            </a:r>
+            <a:r>
+              <a:rPr lang="en-US" dirty="0" smtClean="0"/>
+              <a:t>it on the command line</a:t>
+            </a:r>
+            <a:endParaRPr lang="en-US" dirty="0" smtClean="0"/>
           </a:p>
           <a:p>
             <a:pPr lvl="1"/>
@@ -3391,14 +3379,25 @@
         </p:spPr>
         <p:txBody>
           <a:bodyPr>
-            <a:normAutofit lnSpcReduction="10000"/>
+            <a:normAutofit/>
           </a:bodyPr>
           <a:lstStyle/>
           <a:p>
             <a:r>
               <a:rPr lang="en-US" dirty="0" smtClean="0"/>
-              <a:t>Modules are contained in a single python file and contains all of the variables, functions and classes that you can use in an external program</a:t>
-            </a:r>
+              <a:t>Modules are contained in a single python file and contains all of the variables, functions and classes that you can use in an external </a:t>
+            </a:r>
+            <a:r>
+              <a:rPr lang="en-US" dirty="0" smtClean="0"/>
+              <a:t>program</a:t>
+            </a:r>
+          </a:p>
+          <a:p>
+            <a:r>
+              <a:rPr lang="en-US" dirty="0" smtClean="0"/>
+              <a:t>You will be able to interact with that module as if the code was pasted right on top of your code, with a caveat</a:t>
+            </a:r>
+            <a:endParaRPr lang="en-US" dirty="0" smtClean="0"/>
           </a:p>
           <a:p>
             <a:pPr marL="0" indent="0">
@@ -3407,69 +3406,6 @@
             <a:endParaRPr lang="en-US" b="1" dirty="0" smtClean="0">
               <a:latin typeface="Courier New"/>
               <a:cs typeface="Courier New"/>
-            </a:endParaRPr>
-          </a:p>
-          <a:p>
-            <a:pPr marL="0" indent="0">
-              <a:buNone/>
-            </a:pPr>
-            <a:r>
-              <a:rPr lang="en-US" b="1" dirty="0" smtClean="0">
-                <a:latin typeface="Courier New"/>
-                <a:cs typeface="Courier New"/>
-              </a:rPr>
-              <a:t>import sys</a:t>
-            </a:r>
-          </a:p>
-          <a:p>
-            <a:pPr marL="0" indent="0">
-              <a:buNone/>
-            </a:pPr>
-            <a:r>
-              <a:rPr lang="en-US" dirty="0" smtClean="0">
-                <a:latin typeface="Courier New"/>
-                <a:cs typeface="Courier New"/>
-              </a:rPr>
-              <a:t>print(‘Program Arguments: ’, </a:t>
-            </a:r>
-            <a:r>
-              <a:rPr lang="en-US" dirty="0" err="1" smtClean="0">
-                <a:latin typeface="Courier New"/>
-                <a:cs typeface="Courier New"/>
-              </a:rPr>
-              <a:t>sys.argv</a:t>
-            </a:r>
-            <a:r>
-              <a:rPr lang="en-US" dirty="0" smtClean="0">
-                <a:latin typeface="Courier New"/>
-                <a:cs typeface="Courier New"/>
-              </a:rPr>
-              <a:t>)</a:t>
-            </a:r>
-          </a:p>
-          <a:p>
-            <a:pPr marL="0" indent="0">
-              <a:buNone/>
-            </a:pPr>
-            <a:endParaRPr lang="en-US" dirty="0" smtClean="0">
-              <a:latin typeface="Courier New"/>
-              <a:cs typeface="Courier New"/>
-            </a:endParaRPr>
-          </a:p>
-          <a:p>
-            <a:pPr marL="0" indent="0">
-              <a:buNone/>
-            </a:pPr>
-            <a:r>
-              <a:rPr lang="en-US" b="1" dirty="0" smtClean="0">
-                <a:latin typeface="Calibri"/>
-                <a:cs typeface="Calibri"/>
-              </a:rPr>
-              <a:t>Note: Sys is a module</a:t>
-            </a:r>
-            <a:endParaRPr lang="en-US" b="1" dirty="0">
-              <a:latin typeface="Calibri"/>
-              <a:cs typeface="Calibri"/>
             </a:endParaRPr>
           </a:p>
         </p:txBody>
@@ -3521,7 +3457,7 @@
           <a:p>
             <a:r>
               <a:rPr lang="en-US" dirty="0" smtClean="0"/>
-              <a:t>Packages</a:t>
+              <a:t>Modules example</a:t>
             </a:r>
             <a:endParaRPr lang="en-US" dirty="0"/>
           </a:p>
@@ -3539,26 +3475,26 @@
         </p:nvSpPr>
         <p:spPr/>
         <p:txBody>
-          <a:bodyPr/>
+          <a:bodyPr>
+            <a:normAutofit fontScale="85000" lnSpcReduction="20000"/>
+          </a:bodyPr>
           <a:lstStyle/>
           <a:p>
             <a:r>
               <a:rPr lang="en-US" dirty="0" smtClean="0"/>
-              <a:t>A directory that </a:t>
-            </a:r>
-            <a:r>
-              <a:rPr lang="en-US" dirty="0" err="1" smtClean="0"/>
-              <a:t>containes</a:t>
-            </a:r>
-            <a:r>
-              <a:rPr lang="en-US" dirty="0" smtClean="0"/>
-              <a:t> a collection of modules</a:t>
-            </a:r>
-          </a:p>
-          <a:p>
-            <a:r>
-              <a:rPr lang="en-US" dirty="0" smtClean="0"/>
-              <a:t>Great way to organize modules that are related to each other</a:t>
+              <a:t>For example let’s look at the following code:</a:t>
+            </a:r>
+          </a:p>
+          <a:p>
+            <a:pPr marL="0" indent="0">
+              <a:buNone/>
+            </a:pPr>
+            <a:r>
+              <a:rPr lang="en-US" b="1" dirty="0">
+                <a:latin typeface="Courier New"/>
+                <a:cs typeface="Courier New"/>
+              </a:rPr>
+              <a:t>import sys</a:t>
             </a:r>
           </a:p>
           <a:p>
@@ -3570,24 +3506,278 @@
                 <a:latin typeface="Courier New"/>
                 <a:cs typeface="Courier New"/>
               </a:rPr>
-              <a:t>i</a:t>
-            </a:r>
+              <a:t>print(‘Program Arguments: ’, </a:t>
+            </a:r>
+            <a:r>
+              <a:rPr lang="en-US" dirty="0" err="1">
+                <a:latin typeface="Courier New"/>
+                <a:cs typeface="Courier New"/>
+              </a:rPr>
+              <a:t>sys.argv</a:t>
+            </a:r>
+            <a:r>
+              <a:rPr lang="en-US" dirty="0">
+                <a:latin typeface="Courier New"/>
+                <a:cs typeface="Courier New"/>
+              </a:rPr>
+              <a:t>)</a:t>
+            </a:r>
+          </a:p>
+          <a:p>
+            <a:pPr marL="0" indent="0">
+              <a:buNone/>
+            </a:pPr>
+            <a:endParaRPr lang="en-US" dirty="0">
+              <a:latin typeface="Courier New"/>
+              <a:cs typeface="Courier New"/>
+            </a:endParaRPr>
+          </a:p>
+          <a:p>
+            <a:r>
+              <a:rPr lang="en-US" dirty="0" smtClean="0"/>
+              <a:t>We have imported a module called sys that we wanted to add to our code. We import the sys module to use functionality implemented in </a:t>
+            </a:r>
+            <a:r>
+              <a:rPr lang="en-US" dirty="0" err="1" smtClean="0"/>
+              <a:t>sys.py</a:t>
+            </a:r>
+            <a:endParaRPr lang="en-US" dirty="0" smtClean="0"/>
+          </a:p>
+          <a:p>
+            <a:r>
+              <a:rPr lang="en-US" dirty="0" smtClean="0"/>
+              <a:t>The caveat is that in order to prevent naming conflicts, in order to access anything in the sys module you will need to prefix the variable/function/class with sys, i.e. </a:t>
+            </a:r>
+            <a:r>
+              <a:rPr lang="en-US" dirty="0" err="1" smtClean="0"/>
+              <a:t>sys.argv</a:t>
+            </a:r>
+            <a:r>
+              <a:rPr lang="en-US" dirty="0" smtClean="0"/>
+              <a:t>), even though in the file </a:t>
+            </a:r>
+            <a:r>
+              <a:rPr lang="en-US" dirty="0" err="1" smtClean="0"/>
+              <a:t>sys.py</a:t>
+            </a:r>
+            <a:r>
+              <a:rPr lang="en-US" dirty="0" smtClean="0"/>
+              <a:t> the variable “</a:t>
+            </a:r>
+            <a:r>
+              <a:rPr lang="en-US" dirty="0" err="1" smtClean="0"/>
+              <a:t>argv</a:t>
+            </a:r>
+            <a:r>
+              <a:rPr lang="en-US" dirty="0" smtClean="0"/>
+              <a:t>” is a global variable</a:t>
+            </a:r>
+            <a:endParaRPr lang="en-US" dirty="0"/>
+          </a:p>
+        </p:txBody>
+      </p:sp>
+    </p:spTree>
+    <p:extLst>
+      <p:ext uri="{BB962C8B-B14F-4D97-AF65-F5344CB8AC3E}">
+        <p14:creationId xmlns:p14="http://schemas.microsoft.com/office/powerpoint/2010/main" val="2036925359"/>
+      </p:ext>
+    </p:extLst>
+  </p:cSld>
+  <p:clrMapOvr>
+    <a:masterClrMapping/>
+  </p:clrMapOvr>
+</p:sld>
+</file>
+
+<file path=ppt/slides/slide5.xml><?xml version="1.0" encoding="utf-8"?>
+<p:sld xmlns:a="http://schemas.openxmlformats.org/drawingml/2006/main" xmlns:r="http://schemas.openxmlformats.org/officeDocument/2006/relationships" xmlns:p="http://schemas.openxmlformats.org/presentationml/2006/main">
+  <p:cSld>
+    <p:spTree>
+      <p:nvGrpSpPr>
+        <p:cNvPr id="1" name=""/>
+        <p:cNvGrpSpPr/>
+        <p:nvPr/>
+      </p:nvGrpSpPr>
+      <p:grpSpPr>
+        <a:xfrm>
+          <a:off x="0" y="0"/>
+          <a:ext cx="0" cy="0"/>
+          <a:chOff x="0" y="0"/>
+          <a:chExt cx="0" cy="0"/>
+        </a:xfrm>
+      </p:grpSpPr>
+      <p:sp>
+        <p:nvSpPr>
+          <p:cNvPr id="2" name="Title 1"/>
+          <p:cNvSpPr>
+            <a:spLocks noGrp="1"/>
+          </p:cNvSpPr>
+          <p:nvPr>
+            <p:ph type="title"/>
+          </p:nvPr>
+        </p:nvSpPr>
+        <p:spPr/>
+        <p:txBody>
+          <a:bodyPr/>
+          <a:lstStyle/>
+          <a:p>
+            <a:r>
+              <a:rPr lang="en-US" dirty="0" smtClean="0"/>
+              <a:t>Packages</a:t>
+            </a:r>
+            <a:endParaRPr lang="en-US" dirty="0"/>
+          </a:p>
+        </p:txBody>
+      </p:sp>
+      <p:sp>
+        <p:nvSpPr>
+          <p:cNvPr id="3" name="Content Placeholder 2"/>
+          <p:cNvSpPr>
+            <a:spLocks noGrp="1"/>
+          </p:cNvSpPr>
+          <p:nvPr>
+            <p:ph idx="1"/>
+          </p:nvPr>
+        </p:nvSpPr>
+        <p:spPr/>
+        <p:txBody>
+          <a:bodyPr>
+            <a:normAutofit/>
+          </a:bodyPr>
+          <a:lstStyle/>
+          <a:p>
+            <a:r>
+              <a:rPr lang="en-US" dirty="0" smtClean="0"/>
+              <a:t>A directory that </a:t>
+            </a:r>
+            <a:r>
+              <a:rPr lang="en-US" dirty="0" smtClean="0"/>
+              <a:t>contains </a:t>
+            </a:r>
+            <a:r>
+              <a:rPr lang="en-US" dirty="0" smtClean="0"/>
+              <a:t>a collection of modules</a:t>
+            </a:r>
+          </a:p>
+          <a:p>
+            <a:r>
+              <a:rPr lang="en-US" dirty="0" smtClean="0"/>
+              <a:t>Great way to organize modules that are related to each </a:t>
+            </a:r>
+            <a:r>
+              <a:rPr lang="en-US" dirty="0" smtClean="0"/>
+              <a:t>other</a:t>
+            </a:r>
+          </a:p>
+          <a:p>
+            <a:r>
+              <a:rPr lang="en-US" dirty="0" smtClean="0"/>
+              <a:t>Packages are essentially directories that has a special empty file named “__</a:t>
+            </a:r>
+            <a:r>
+              <a:rPr lang="en-US" dirty="0" err="1" smtClean="0"/>
+              <a:t>init.py</a:t>
+            </a:r>
+            <a:r>
+              <a:rPr lang="en-US" dirty="0" smtClean="0"/>
+              <a:t>__”. The existence of this file tells python that the directory is a python package.</a:t>
+            </a:r>
+          </a:p>
+        </p:txBody>
+      </p:sp>
+    </p:spTree>
+    <p:extLst>
+      <p:ext uri="{BB962C8B-B14F-4D97-AF65-F5344CB8AC3E}">
+        <p14:creationId xmlns:p14="http://schemas.microsoft.com/office/powerpoint/2010/main" val="1054880523"/>
+      </p:ext>
+    </p:extLst>
+  </p:cSld>
+  <p:clrMapOvr>
+    <a:masterClrMapping/>
+  </p:clrMapOvr>
+</p:sld>
+</file>
+
+<file path=ppt/slides/slide6.xml><?xml version="1.0" encoding="utf-8"?>
+<p:sld xmlns:a="http://schemas.openxmlformats.org/drawingml/2006/main" xmlns:r="http://schemas.openxmlformats.org/officeDocument/2006/relationships" xmlns:p="http://schemas.openxmlformats.org/presentationml/2006/main">
+  <p:cSld>
+    <p:spTree>
+      <p:nvGrpSpPr>
+        <p:cNvPr id="1" name=""/>
+        <p:cNvGrpSpPr/>
+        <p:nvPr/>
+      </p:nvGrpSpPr>
+      <p:grpSpPr>
+        <a:xfrm>
+          <a:off x="0" y="0"/>
+          <a:ext cx="0" cy="0"/>
+          <a:chOff x="0" y="0"/>
+          <a:chExt cx="0" cy="0"/>
+        </a:xfrm>
+      </p:grpSpPr>
+      <p:sp>
+        <p:nvSpPr>
+          <p:cNvPr id="2" name="Title 1"/>
+          <p:cNvSpPr>
+            <a:spLocks noGrp="1"/>
+          </p:cNvSpPr>
+          <p:nvPr>
+            <p:ph type="title"/>
+          </p:nvPr>
+        </p:nvSpPr>
+        <p:spPr/>
+        <p:txBody>
+          <a:bodyPr/>
+          <a:lstStyle/>
+          <a:p>
+            <a:r>
+              <a:rPr lang="en-US" dirty="0" smtClean="0"/>
+              <a:t>Packages example</a:t>
+            </a:r>
+            <a:endParaRPr lang="en-US" dirty="0"/>
+          </a:p>
+        </p:txBody>
+      </p:sp>
+      <p:sp>
+        <p:nvSpPr>
+          <p:cNvPr id="3" name="Content Placeholder 2"/>
+          <p:cNvSpPr>
+            <a:spLocks noGrp="1"/>
+          </p:cNvSpPr>
+          <p:nvPr>
+            <p:ph idx="1"/>
+          </p:nvPr>
+        </p:nvSpPr>
+        <p:spPr/>
+        <p:txBody>
+          <a:bodyPr/>
+          <a:lstStyle/>
+          <a:p>
+            <a:r>
+              <a:rPr lang="en-US" dirty="0" smtClean="0"/>
+              <a:t>For example:</a:t>
+            </a:r>
+          </a:p>
+          <a:p>
+            <a:pPr marL="0" indent="0">
+              <a:buNone/>
+            </a:pPr>
             <a:r>
               <a:rPr lang="en-US" dirty="0" smtClean="0">
                 <a:latin typeface="Courier New"/>
                 <a:cs typeface="Courier New"/>
               </a:rPr>
-              <a:t>mport </a:t>
-            </a:r>
-            <a:r>
-              <a:rPr lang="en-US" b="1" smtClean="0">
+              <a:t>import </a:t>
+            </a:r>
+            <a:r>
+              <a:rPr lang="en-US" b="1" dirty="0" err="1" smtClean="0">
                 <a:latin typeface="Courier New"/>
                 <a:cs typeface="Courier New"/>
               </a:rPr>
               <a:t>numpy</a:t>
             </a:r>
             <a:r>
-              <a:rPr lang="en-US" smtClean="0">
+              <a:rPr lang="en-US" dirty="0" err="1" smtClean="0">
                 <a:latin typeface="Courier New"/>
                 <a:cs typeface="Courier New"/>
               </a:rPr>
@@ -3598,12 +3788,82 @@
               <a:cs typeface="Courier New"/>
             </a:endParaRPr>
           </a:p>
+          <a:p>
+            <a:r>
+              <a:rPr lang="en-US" dirty="0" smtClean="0"/>
+              <a:t>In this example “</a:t>
+            </a:r>
+            <a:r>
+              <a:rPr lang="en-US" dirty="0" err="1" smtClean="0"/>
+              <a:t>numpy</a:t>
+            </a:r>
+            <a:r>
+              <a:rPr lang="en-US" dirty="0" smtClean="0"/>
+              <a:t>” is the package and “</a:t>
+            </a:r>
+            <a:r>
+              <a:rPr lang="en-US" dirty="0" err="1" smtClean="0"/>
+              <a:t>matlib</a:t>
+            </a:r>
+            <a:r>
+              <a:rPr lang="en-US" dirty="0" smtClean="0"/>
+              <a:t>” is the module within the package </a:t>
+            </a:r>
+            <a:r>
+              <a:rPr lang="en-US" dirty="0" err="1" smtClean="0"/>
+              <a:t>numpy</a:t>
+            </a:r>
+            <a:endParaRPr lang="en-US" dirty="0" smtClean="0"/>
+          </a:p>
+          <a:p>
+            <a:r>
+              <a:rPr lang="en-US" dirty="0" smtClean="0"/>
+              <a:t>The package “</a:t>
+            </a:r>
+            <a:r>
+              <a:rPr lang="en-US" dirty="0" err="1" smtClean="0"/>
+              <a:t>numpy</a:t>
+            </a:r>
+            <a:r>
+              <a:rPr lang="en-US" dirty="0" smtClean="0"/>
+              <a:t>” has a empty file named “__</a:t>
+            </a:r>
+            <a:r>
+              <a:rPr lang="en-US" dirty="0" err="1" smtClean="0"/>
+              <a:t>init.py</a:t>
+            </a:r>
+            <a:r>
+              <a:rPr lang="en-US" dirty="0" smtClean="0"/>
+              <a:t>__” that tells Python that </a:t>
+            </a:r>
+            <a:r>
+              <a:rPr lang="en-US" dirty="0" err="1" smtClean="0"/>
+              <a:t>numpy</a:t>
+            </a:r>
+            <a:r>
+              <a:rPr lang="en-US" dirty="0" smtClean="0"/>
+              <a:t> is a package</a:t>
+            </a:r>
+            <a:endParaRPr lang="en-US" dirty="0"/>
+          </a:p>
+          <a:p>
+            <a:pPr marL="0" indent="0">
+              <a:buNone/>
+            </a:pPr>
+            <a:endParaRPr lang="en-US" dirty="0">
+              <a:latin typeface="Courier New"/>
+              <a:cs typeface="Courier New"/>
+            </a:endParaRPr>
+          </a:p>
+          <a:p>
+            <a:endParaRPr lang="en-US" dirty="0"/>
+          </a:p>
         </p:txBody>
       </p:sp>
     </p:spTree>
     <p:extLst>
       <p:ext uri="{BB962C8B-B14F-4D97-AF65-F5344CB8AC3E}">
-        <p14:creationId xmlns:p14="http://schemas.microsoft.com/office/powerpoint/2010/main" val="1054880523"/>
+        <p14:creationId xmlns:p14="http://schemas.microsoft.com/office/powerpoint/2010/main" val="2530191732"/>
       </p:ext>
     </p:extLst>
   </p:cSld>

</xml_diff>